<commit_message>
[DEV] KANG - add result.html, swiper.html
</commit_message>
<xml_diff>
--- a/facemaker/document/design.pptx
+++ b/facemaker/document/design.pptx
@@ -202,7 +202,7 @@
           <a:p>
             <a:fld id="{D40524FD-5CB0-4AF7-B76F-FEEF5B9207AB}" type="datetimeFigureOut">
               <a:rPr lang="ko-KR" altLang="en-US" smtClean="0"/>
-              <a:t>2020-06-19</a:t>
+              <a:t>2020-06-20</a:t>
             </a:fld>
             <a:endParaRPr lang="ko-KR" altLang="en-US"/>
           </a:p>
@@ -1590,7 +1590,7 @@
           <a:p>
             <a:fld id="{39CDCDD4-8E38-4F36-87A1-8853D7975FB2}" type="datetimeFigureOut">
               <a:rPr lang="ko-KR" altLang="en-US" smtClean="0"/>
-              <a:t>2020-06-19</a:t>
+              <a:t>2020-06-20</a:t>
             </a:fld>
             <a:endParaRPr lang="ko-KR" altLang="en-US"/>
           </a:p>
@@ -1760,7 +1760,7 @@
           <a:p>
             <a:fld id="{39CDCDD4-8E38-4F36-87A1-8853D7975FB2}" type="datetimeFigureOut">
               <a:rPr lang="ko-KR" altLang="en-US" smtClean="0"/>
-              <a:t>2020-06-19</a:t>
+              <a:t>2020-06-20</a:t>
             </a:fld>
             <a:endParaRPr lang="ko-KR" altLang="en-US"/>
           </a:p>
@@ -1940,7 +1940,7 @@
           <a:p>
             <a:fld id="{39CDCDD4-8E38-4F36-87A1-8853D7975FB2}" type="datetimeFigureOut">
               <a:rPr lang="ko-KR" altLang="en-US" smtClean="0"/>
-              <a:t>2020-06-19</a:t>
+              <a:t>2020-06-20</a:t>
             </a:fld>
             <a:endParaRPr lang="ko-KR" altLang="en-US"/>
           </a:p>
@@ -2110,7 +2110,7 @@
           <a:p>
             <a:fld id="{39CDCDD4-8E38-4F36-87A1-8853D7975FB2}" type="datetimeFigureOut">
               <a:rPr lang="ko-KR" altLang="en-US" smtClean="0"/>
-              <a:t>2020-06-19</a:t>
+              <a:t>2020-06-20</a:t>
             </a:fld>
             <a:endParaRPr lang="ko-KR" altLang="en-US"/>
           </a:p>
@@ -2354,7 +2354,7 @@
           <a:p>
             <a:fld id="{39CDCDD4-8E38-4F36-87A1-8853D7975FB2}" type="datetimeFigureOut">
               <a:rPr lang="ko-KR" altLang="en-US" smtClean="0"/>
-              <a:t>2020-06-19</a:t>
+              <a:t>2020-06-20</a:t>
             </a:fld>
             <a:endParaRPr lang="ko-KR" altLang="en-US"/>
           </a:p>
@@ -2586,7 +2586,7 @@
           <a:p>
             <a:fld id="{39CDCDD4-8E38-4F36-87A1-8853D7975FB2}" type="datetimeFigureOut">
               <a:rPr lang="ko-KR" altLang="en-US" smtClean="0"/>
-              <a:t>2020-06-19</a:t>
+              <a:t>2020-06-20</a:t>
             </a:fld>
             <a:endParaRPr lang="ko-KR" altLang="en-US"/>
           </a:p>
@@ -2953,7 +2953,7 @@
           <a:p>
             <a:fld id="{39CDCDD4-8E38-4F36-87A1-8853D7975FB2}" type="datetimeFigureOut">
               <a:rPr lang="ko-KR" altLang="en-US" smtClean="0"/>
-              <a:t>2020-06-19</a:t>
+              <a:t>2020-06-20</a:t>
             </a:fld>
             <a:endParaRPr lang="ko-KR" altLang="en-US"/>
           </a:p>
@@ -3071,7 +3071,7 @@
           <a:p>
             <a:fld id="{39CDCDD4-8E38-4F36-87A1-8853D7975FB2}" type="datetimeFigureOut">
               <a:rPr lang="ko-KR" altLang="en-US" smtClean="0"/>
-              <a:t>2020-06-19</a:t>
+              <a:t>2020-06-20</a:t>
             </a:fld>
             <a:endParaRPr lang="ko-KR" altLang="en-US"/>
           </a:p>
@@ -3166,7 +3166,7 @@
           <a:p>
             <a:fld id="{39CDCDD4-8E38-4F36-87A1-8853D7975FB2}" type="datetimeFigureOut">
               <a:rPr lang="ko-KR" altLang="en-US" smtClean="0"/>
-              <a:t>2020-06-19</a:t>
+              <a:t>2020-06-20</a:t>
             </a:fld>
             <a:endParaRPr lang="ko-KR" altLang="en-US"/>
           </a:p>
@@ -3443,7 +3443,7 @@
           <a:p>
             <a:fld id="{39CDCDD4-8E38-4F36-87A1-8853D7975FB2}" type="datetimeFigureOut">
               <a:rPr lang="ko-KR" altLang="en-US" smtClean="0"/>
-              <a:t>2020-06-19</a:t>
+              <a:t>2020-06-20</a:t>
             </a:fld>
             <a:endParaRPr lang="ko-KR" altLang="en-US"/>
           </a:p>
@@ -3700,7 +3700,7 @@
           <a:p>
             <a:fld id="{39CDCDD4-8E38-4F36-87A1-8853D7975FB2}" type="datetimeFigureOut">
               <a:rPr lang="ko-KR" altLang="en-US" smtClean="0"/>
-              <a:t>2020-06-19</a:t>
+              <a:t>2020-06-20</a:t>
             </a:fld>
             <a:endParaRPr lang="ko-KR" altLang="en-US"/>
           </a:p>
@@ -3913,7 +3913,7 @@
           <a:p>
             <a:fld id="{39CDCDD4-8E38-4F36-87A1-8853D7975FB2}" type="datetimeFigureOut">
               <a:rPr lang="ko-KR" altLang="en-US" smtClean="0"/>
-              <a:t>2020-06-19</a:t>
+              <a:t>2020-06-20</a:t>
             </a:fld>
             <a:endParaRPr lang="ko-KR" altLang="en-US"/>
           </a:p>

</xml_diff>